<commit_message>
removed a placeholder slide
</commit_message>
<xml_diff>
--- a/presentations/Presentation1.pptx
+++ b/presentations/Presentation1.pptx
@@ -9,12 +9,11 @@
     <p:sldId id="257" r:id="rId3"/>
     <p:sldId id="258" r:id="rId4"/>
     <p:sldId id="259" r:id="rId5"/>
-    <p:sldId id="260" r:id="rId6"/>
-    <p:sldId id="265" r:id="rId7"/>
-    <p:sldId id="266" r:id="rId8"/>
-    <p:sldId id="261" r:id="rId9"/>
-    <p:sldId id="263" r:id="rId10"/>
-    <p:sldId id="264" r:id="rId11"/>
+    <p:sldId id="265" r:id="rId6"/>
+    <p:sldId id="266" r:id="rId7"/>
+    <p:sldId id="261" r:id="rId8"/>
+    <p:sldId id="263" r:id="rId9"/>
+    <p:sldId id="264" r:id="rId10"/>
   </p:sldIdLst>
   <p:sldSz cx="9144000" cy="6858000" type="screen4x3"/>
   <p:notesSz cx="6858000" cy="9144000"/>
@@ -313,7 +312,7 @@
           <a:p>
             <a:fld id="{8D21E65C-9A1B-A246-A95A-EE221E9A05F8}" type="datetimeFigureOut">
               <a:rPr lang="en-US" smtClean="0"/>
-              <a:t>11/11/2014</a:t>
+              <a:t>11/12/2014</a:t>
             </a:fld>
             <a:endParaRPr lang="en-US"/>
           </a:p>
@@ -483,7 +482,7 @@
           <a:p>
             <a:fld id="{8D21E65C-9A1B-A246-A95A-EE221E9A05F8}" type="datetimeFigureOut">
               <a:rPr lang="en-US" smtClean="0"/>
-              <a:t>11/11/2014</a:t>
+              <a:t>11/12/2014</a:t>
             </a:fld>
             <a:endParaRPr lang="en-US"/>
           </a:p>
@@ -663,7 +662,7 @@
           <a:p>
             <a:fld id="{8D21E65C-9A1B-A246-A95A-EE221E9A05F8}" type="datetimeFigureOut">
               <a:rPr lang="en-US" smtClean="0"/>
-              <a:t>11/11/2014</a:t>
+              <a:t>11/12/2014</a:t>
             </a:fld>
             <a:endParaRPr lang="en-US"/>
           </a:p>
@@ -833,7 +832,7 @@
           <a:p>
             <a:fld id="{8D21E65C-9A1B-A246-A95A-EE221E9A05F8}" type="datetimeFigureOut">
               <a:rPr lang="en-US" smtClean="0"/>
-              <a:t>11/11/2014</a:t>
+              <a:t>11/12/2014</a:t>
             </a:fld>
             <a:endParaRPr lang="en-US"/>
           </a:p>
@@ -1079,7 +1078,7 @@
           <a:p>
             <a:fld id="{8D21E65C-9A1B-A246-A95A-EE221E9A05F8}" type="datetimeFigureOut">
               <a:rPr lang="en-US" smtClean="0"/>
-              <a:t>11/11/2014</a:t>
+              <a:t>11/12/2014</a:t>
             </a:fld>
             <a:endParaRPr lang="en-US"/>
           </a:p>
@@ -1367,7 +1366,7 @@
           <a:p>
             <a:fld id="{8D21E65C-9A1B-A246-A95A-EE221E9A05F8}" type="datetimeFigureOut">
               <a:rPr lang="en-US" smtClean="0"/>
-              <a:t>11/11/2014</a:t>
+              <a:t>11/12/2014</a:t>
             </a:fld>
             <a:endParaRPr lang="en-US"/>
           </a:p>
@@ -1789,7 +1788,7 @@
           <a:p>
             <a:fld id="{8D21E65C-9A1B-A246-A95A-EE221E9A05F8}" type="datetimeFigureOut">
               <a:rPr lang="en-US" smtClean="0"/>
-              <a:t>11/11/2014</a:t>
+              <a:t>11/12/2014</a:t>
             </a:fld>
             <a:endParaRPr lang="en-US"/>
           </a:p>
@@ -1907,7 +1906,7 @@
           <a:p>
             <a:fld id="{8D21E65C-9A1B-A246-A95A-EE221E9A05F8}" type="datetimeFigureOut">
               <a:rPr lang="en-US" smtClean="0"/>
-              <a:t>11/11/2014</a:t>
+              <a:t>11/12/2014</a:t>
             </a:fld>
             <a:endParaRPr lang="en-US"/>
           </a:p>
@@ -2002,7 +2001,7 @@
           <a:p>
             <a:fld id="{8D21E65C-9A1B-A246-A95A-EE221E9A05F8}" type="datetimeFigureOut">
               <a:rPr lang="en-US" smtClean="0"/>
-              <a:t>11/11/2014</a:t>
+              <a:t>11/12/2014</a:t>
             </a:fld>
             <a:endParaRPr lang="en-US"/>
           </a:p>
@@ -2279,7 +2278,7 @@
           <a:p>
             <a:fld id="{8D21E65C-9A1B-A246-A95A-EE221E9A05F8}" type="datetimeFigureOut">
               <a:rPr lang="en-US" smtClean="0"/>
-              <a:t>11/11/2014</a:t>
+              <a:t>11/12/2014</a:t>
             </a:fld>
             <a:endParaRPr lang="en-US"/>
           </a:p>
@@ -2532,7 +2531,7 @@
           <a:p>
             <a:fld id="{8D21E65C-9A1B-A246-A95A-EE221E9A05F8}" type="datetimeFigureOut">
               <a:rPr lang="en-US" smtClean="0"/>
-              <a:t>11/11/2014</a:t>
+              <a:t>11/12/2014</a:t>
             </a:fld>
             <a:endParaRPr lang="en-US"/>
           </a:p>
@@ -2745,7 +2744,7 @@
           <a:p>
             <a:fld id="{8D21E65C-9A1B-A246-A95A-EE221E9A05F8}" type="datetimeFigureOut">
               <a:rPr lang="en-US" smtClean="0"/>
-              <a:t>11/11/2014</a:t>
+              <a:t>11/12/2014</a:t>
             </a:fld>
             <a:endParaRPr lang="en-US"/>
           </a:p>
@@ -3272,330 +3271,6 @@
 </p:sld>
 </file>
 
-<file path=ppt/slides/slide10.xml><?xml version="1.0" encoding="utf-8"?>
-<p:sld xmlns:a="http://schemas.openxmlformats.org/drawingml/2006/main" xmlns:r="http://schemas.openxmlformats.org/officeDocument/2006/relationships" xmlns:p="http://schemas.openxmlformats.org/presentationml/2006/main">
-  <p:cSld>
-    <p:spTree>
-      <p:nvGrpSpPr>
-        <p:cNvPr id="1" name=""/>
-        <p:cNvGrpSpPr/>
-        <p:nvPr/>
-      </p:nvGrpSpPr>
-      <p:grpSpPr>
-        <a:xfrm>
-          <a:off x="0" y="0"/>
-          <a:ext cx="0" cy="0"/>
-          <a:chOff x="0" y="0"/>
-          <a:chExt cx="0" cy="0"/>
-        </a:xfrm>
-      </p:grpSpPr>
-      <p:sp>
-        <p:nvSpPr>
-          <p:cNvPr id="2" name="Title 1"/>
-          <p:cNvSpPr>
-            <a:spLocks noGrp="1"/>
-          </p:cNvSpPr>
-          <p:nvPr>
-            <p:ph type="title"/>
-          </p:nvPr>
-        </p:nvSpPr>
-        <p:spPr/>
-        <p:txBody>
-          <a:bodyPr/>
-          <a:lstStyle/>
-          <a:p>
-            <a:r>
-              <a:rPr lang="en-US" dirty="0" smtClean="0">
-                <a:latin typeface="Cambria"/>
-                <a:cs typeface="Cambria"/>
-              </a:rPr>
-              <a:t>Expanded Features List</a:t>
-            </a:r>
-            <a:endParaRPr lang="en-US" dirty="0">
-              <a:latin typeface="Cambria"/>
-              <a:cs typeface="Cambria"/>
-            </a:endParaRPr>
-          </a:p>
-        </p:txBody>
-      </p:sp>
-      <p:pic>
-        <p:nvPicPr>
-          <p:cNvPr id="4" name="Picture 3" descr="icon.png"/>
-          <p:cNvPicPr>
-            <a:picLocks noChangeAspect="1"/>
-          </p:cNvPicPr>
-          <p:nvPr/>
-        </p:nvPicPr>
-        <p:blipFill>
-          <a:blip r:embed="rId2">
-            <a:extLst>
-              <a:ext uri="{28A0092B-C50C-407E-A947-70E740481C1C}">
-                <a14:useLocalDpi xmlns:a14="http://schemas.microsoft.com/office/drawing/2010/main" val="0"/>
-              </a:ext>
-            </a:extLst>
-          </a:blip>
-          <a:stretch>
-            <a:fillRect/>
-          </a:stretch>
-        </p:blipFill>
-        <p:spPr>
-          <a:xfrm>
-            <a:off x="1916289" y="1676399"/>
-            <a:ext cx="2317044" cy="2317044"/>
-          </a:xfrm>
-          <a:prstGeom prst="rect">
-            <a:avLst/>
-          </a:prstGeom>
-        </p:spPr>
-      </p:pic>
-      <p:pic>
-        <p:nvPicPr>
-          <p:cNvPr id="5" name="Picture 4" descr="map-7.png"/>
-          <p:cNvPicPr>
-            <a:picLocks noChangeAspect="1"/>
-          </p:cNvPicPr>
-          <p:nvPr/>
-        </p:nvPicPr>
-        <p:blipFill>
-          <a:blip r:embed="rId3">
-            <a:extLst>
-              <a:ext uri="{28A0092B-C50C-407E-A947-70E740481C1C}">
-                <a14:useLocalDpi xmlns:a14="http://schemas.microsoft.com/office/drawing/2010/main" val="0"/>
-              </a:ext>
-            </a:extLst>
-          </a:blip>
-          <a:stretch>
-            <a:fillRect/>
-          </a:stretch>
-        </p:blipFill>
-        <p:spPr>
-          <a:xfrm>
-            <a:off x="5367868" y="1859844"/>
-            <a:ext cx="1738489" cy="1738489"/>
-          </a:xfrm>
-          <a:prstGeom prst="rect">
-            <a:avLst/>
-          </a:prstGeom>
-        </p:spPr>
-      </p:pic>
-      <p:pic>
-        <p:nvPicPr>
-          <p:cNvPr id="6" name="Picture 5" descr="39915.png"/>
-          <p:cNvPicPr>
-            <a:picLocks noChangeAspect="1"/>
-          </p:cNvPicPr>
-          <p:nvPr/>
-        </p:nvPicPr>
-        <p:blipFill>
-          <a:blip r:embed="rId4">
-            <a:extLst>
-              <a:ext uri="{28A0092B-C50C-407E-A947-70E740481C1C}">
-                <a14:useLocalDpi xmlns:a14="http://schemas.microsoft.com/office/drawing/2010/main" val="0"/>
-              </a:ext>
-            </a:extLst>
-          </a:blip>
-          <a:stretch>
-            <a:fillRect/>
-          </a:stretch>
-        </p:blipFill>
-        <p:spPr>
-          <a:xfrm>
-            <a:off x="4840111" y="3759199"/>
-            <a:ext cx="2793890" cy="2793890"/>
-          </a:xfrm>
-          <a:prstGeom prst="rect">
-            <a:avLst/>
-          </a:prstGeom>
-        </p:spPr>
-      </p:pic>
-      <p:sp>
-        <p:nvSpPr>
-          <p:cNvPr id="8" name="TextBox 7"/>
-          <p:cNvSpPr txBox="1"/>
-          <p:nvPr/>
-        </p:nvSpPr>
-        <p:spPr>
-          <a:xfrm>
-            <a:off x="1986844" y="4868334"/>
-            <a:ext cx="2142934" cy="338554"/>
-          </a:xfrm>
-          <a:prstGeom prst="rect">
-            <a:avLst/>
-          </a:prstGeom>
-          <a:noFill/>
-        </p:spPr>
-        <p:txBody>
-          <a:bodyPr wrap="none" rtlCol="0">
-            <a:spAutoFit/>
-          </a:bodyPr>
-          <a:lstStyle/>
-          <a:p>
-            <a:r>
-              <a:rPr lang="en-US" sz="1600" dirty="0" smtClean="0">
-                <a:latin typeface="Arial"/>
-                <a:cs typeface="Arial"/>
-              </a:rPr>
-              <a:t>S&amp;P gains 500 points</a:t>
-            </a:r>
-            <a:endParaRPr lang="en-US" sz="1600" dirty="0">
-              <a:latin typeface="Arial"/>
-              <a:cs typeface="Arial"/>
-            </a:endParaRPr>
-          </a:p>
-        </p:txBody>
-      </p:sp>
-      <p:sp>
-        <p:nvSpPr>
-          <p:cNvPr id="9" name="Rectangle 8"/>
-          <p:cNvSpPr/>
-          <p:nvPr/>
-        </p:nvSpPr>
-        <p:spPr>
-          <a:xfrm>
-            <a:off x="1986844" y="4868334"/>
-            <a:ext cx="2246489" cy="832555"/>
-          </a:xfrm>
-          <a:prstGeom prst="rect">
-            <a:avLst/>
-          </a:prstGeom>
-          <a:noFill/>
-          <a:ln>
-            <a:solidFill>
-              <a:schemeClr val="tx1"/>
-            </a:solidFill>
-          </a:ln>
-          <a:effectLst/>
-        </p:spPr>
-        <p:style>
-          <a:lnRef idx="1">
-            <a:schemeClr val="accent1"/>
-          </a:lnRef>
-          <a:fillRef idx="3">
-            <a:schemeClr val="accent1"/>
-          </a:fillRef>
-          <a:effectRef idx="2">
-            <a:schemeClr val="accent1"/>
-          </a:effectRef>
-          <a:fontRef idx="minor">
-            <a:schemeClr val="lt1"/>
-          </a:fontRef>
-        </p:style>
-        <p:txBody>
-          <a:bodyPr rtlCol="0" anchor="ctr"/>
-          <a:lstStyle/>
-          <a:p>
-            <a:pPr algn="ctr"/>
-            <a:endParaRPr lang="en-US"/>
-          </a:p>
-        </p:txBody>
-      </p:sp>
-      <p:sp>
-        <p:nvSpPr>
-          <p:cNvPr id="10" name="Rounded Rectangle 9"/>
-          <p:cNvSpPr/>
-          <p:nvPr/>
-        </p:nvSpPr>
-        <p:spPr>
-          <a:xfrm>
-            <a:off x="2102556" y="5334000"/>
-            <a:ext cx="705555" cy="225778"/>
-          </a:xfrm>
-          <a:prstGeom prst="roundRect">
-            <a:avLst/>
-          </a:prstGeom>
-          <a:solidFill>
-            <a:srgbClr val="008000"/>
-          </a:solidFill>
-          <a:ln>
-            <a:solidFill>
-              <a:schemeClr val="tx1"/>
-            </a:solidFill>
-          </a:ln>
-          <a:effectLst/>
-        </p:spPr>
-        <p:style>
-          <a:lnRef idx="1">
-            <a:schemeClr val="accent1"/>
-          </a:lnRef>
-          <a:fillRef idx="3">
-            <a:schemeClr val="accent1"/>
-          </a:fillRef>
-          <a:effectRef idx="2">
-            <a:schemeClr val="accent1"/>
-          </a:effectRef>
-          <a:fontRef idx="minor">
-            <a:schemeClr val="lt1"/>
-          </a:fontRef>
-        </p:style>
-        <p:txBody>
-          <a:bodyPr rtlCol="0" anchor="ctr"/>
-          <a:lstStyle/>
-          <a:p>
-            <a:pPr algn="ctr"/>
-            <a:endParaRPr lang="en-US"/>
-          </a:p>
-        </p:txBody>
-      </p:sp>
-      <p:sp>
-        <p:nvSpPr>
-          <p:cNvPr id="11" name="Rounded Rectangle 10"/>
-          <p:cNvSpPr/>
-          <p:nvPr/>
-        </p:nvSpPr>
-        <p:spPr>
-          <a:xfrm>
-            <a:off x="2960511" y="5331178"/>
-            <a:ext cx="705555" cy="225778"/>
-          </a:xfrm>
-          <a:prstGeom prst="roundRect">
-            <a:avLst/>
-          </a:prstGeom>
-          <a:solidFill>
-            <a:srgbClr val="FF0000"/>
-          </a:solidFill>
-          <a:ln>
-            <a:solidFill>
-              <a:srgbClr val="000000"/>
-            </a:solidFill>
-          </a:ln>
-          <a:effectLst/>
-        </p:spPr>
-        <p:style>
-          <a:lnRef idx="1">
-            <a:schemeClr val="accent1"/>
-          </a:lnRef>
-          <a:fillRef idx="3">
-            <a:schemeClr val="accent1"/>
-          </a:fillRef>
-          <a:effectRef idx="2">
-            <a:schemeClr val="accent1"/>
-          </a:effectRef>
-          <a:fontRef idx="minor">
-            <a:schemeClr val="lt1"/>
-          </a:fontRef>
-        </p:style>
-        <p:txBody>
-          <a:bodyPr rtlCol="0" anchor="ctr"/>
-          <a:lstStyle/>
-          <a:p>
-            <a:pPr algn="ctr"/>
-            <a:endParaRPr lang="en-US"/>
-          </a:p>
-        </p:txBody>
-      </p:sp>
-    </p:spTree>
-    <p:extLst>
-      <p:ext uri="{BB962C8B-B14F-4D97-AF65-F5344CB8AC3E}">
-        <p14:creationId xmlns:p14="http://schemas.microsoft.com/office/powerpoint/2010/main" val="3980789510"/>
-      </p:ext>
-    </p:extLst>
-  </p:cSld>
-  <p:clrMapOvr>
-    <a:masterClrMapping/>
-  </p:clrMapOvr>
-</p:sld>
-</file>
-
 <file path=ppt/slides/slide2.xml><?xml version="1.0" encoding="utf-8"?>
 <p:sld xmlns:a="http://schemas.openxmlformats.org/drawingml/2006/main" xmlns:r="http://schemas.openxmlformats.org/officeDocument/2006/relationships" xmlns:p="http://schemas.openxmlformats.org/presentationml/2006/main">
   <p:cSld>
@@ -4181,65 +3856,6 @@
           <a:chExt cx="0" cy="0"/>
         </a:xfrm>
       </p:grpSpPr>
-      <p:sp>
-        <p:nvSpPr>
-          <p:cNvPr id="3" name="Content Placeholder 2"/>
-          <p:cNvSpPr>
-            <a:spLocks noGrp="1"/>
-          </p:cNvSpPr>
-          <p:nvPr>
-            <p:ph idx="1"/>
-          </p:nvPr>
-        </p:nvSpPr>
-        <p:spPr/>
-        <p:txBody>
-          <a:bodyPr/>
-          <a:lstStyle/>
-          <a:p>
-            <a:r>
-              <a:rPr lang="en-US" dirty="0"/>
-              <a:t>Describe the high-level deployment architecture, in particular any distribution, web interaction, database used, etc.</a:t>
-            </a:r>
-          </a:p>
-        </p:txBody>
-      </p:sp>
-    </p:spTree>
-    <p:extLst>
-      <p:ext uri="{BB962C8B-B14F-4D97-AF65-F5344CB8AC3E}">
-        <p14:creationId xmlns:p14="http://schemas.microsoft.com/office/powerpoint/2010/main" val="3420478717"/>
-      </p:ext>
-    </p:extLst>
-  </p:cSld>
-  <p:clrMapOvr>
-    <a:masterClrMapping/>
-  </p:clrMapOvr>
-  <p:timing>
-    <p:tnLst>
-      <p:par>
-        <p:cTn id="1" dur="indefinite" restart="never" nodeType="tmRoot"/>
-      </p:par>
-    </p:tnLst>
-  </p:timing>
-</p:sld>
-</file>
-
-<file path=ppt/slides/slide6.xml><?xml version="1.0" encoding="utf-8"?>
-<p:sld xmlns:a="http://schemas.openxmlformats.org/drawingml/2006/main" xmlns:r="http://schemas.openxmlformats.org/officeDocument/2006/relationships" xmlns:p="http://schemas.openxmlformats.org/presentationml/2006/main">
-  <p:cSld>
-    <p:spTree>
-      <p:nvGrpSpPr>
-        <p:cNvPr id="1" name=""/>
-        <p:cNvGrpSpPr/>
-        <p:nvPr/>
-      </p:nvGrpSpPr>
-      <p:grpSpPr>
-        <a:xfrm>
-          <a:off x="0" y="0"/>
-          <a:ext cx="0" cy="0"/>
-          <a:chOff x="0" y="0"/>
-          <a:chExt cx="0" cy="0"/>
-        </a:xfrm>
-      </p:grpSpPr>
       <p:pic>
         <p:nvPicPr>
           <p:cNvPr id="4" name="Picture 3"/>
@@ -4350,7 +3966,7 @@
 </p:sld>
 </file>
 
-<file path=ppt/slides/slide7.xml><?xml version="1.0" encoding="utf-8"?>
+<file path=ppt/slides/slide6.xml><?xml version="1.0" encoding="utf-8"?>
 <p:sld xmlns:a="http://schemas.openxmlformats.org/drawingml/2006/main" xmlns:r="http://schemas.openxmlformats.org/officeDocument/2006/relationships" xmlns:p="http://schemas.openxmlformats.org/presentationml/2006/main">
   <p:cSld>
     <p:spTree>
@@ -4417,7 +4033,7 @@
 </p:sld>
 </file>
 
-<file path=ppt/slides/slide8.xml><?xml version="1.0" encoding="utf-8"?>
+<file path=ppt/slides/slide7.xml><?xml version="1.0" encoding="utf-8"?>
 <p:sld xmlns:a="http://schemas.openxmlformats.org/drawingml/2006/main" xmlns:r="http://schemas.openxmlformats.org/officeDocument/2006/relationships" xmlns:p="http://schemas.openxmlformats.org/presentationml/2006/main">
   <p:cSld>
     <p:spTree>
@@ -4484,6 +4100,98 @@
 </p:sld>
 </file>
 
+<file path=ppt/slides/slide8.xml><?xml version="1.0" encoding="utf-8"?>
+<p:sld xmlns:a="http://schemas.openxmlformats.org/drawingml/2006/main" xmlns:r="http://schemas.openxmlformats.org/officeDocument/2006/relationships" xmlns:p="http://schemas.openxmlformats.org/presentationml/2006/main">
+  <p:cSld>
+    <p:spTree>
+      <p:nvGrpSpPr>
+        <p:cNvPr id="1" name=""/>
+        <p:cNvGrpSpPr/>
+        <p:nvPr/>
+      </p:nvGrpSpPr>
+      <p:grpSpPr>
+        <a:xfrm>
+          <a:off x="0" y="0"/>
+          <a:ext cx="0" cy="0"/>
+          <a:chOff x="0" y="0"/>
+          <a:chExt cx="0" cy="0"/>
+        </a:xfrm>
+      </p:grpSpPr>
+      <p:sp>
+        <p:nvSpPr>
+          <p:cNvPr id="4" name="TextBox 3"/>
+          <p:cNvSpPr txBox="1"/>
+          <p:nvPr/>
+        </p:nvSpPr>
+        <p:spPr>
+          <a:xfrm>
+            <a:off x="2921000" y="3273778"/>
+            <a:ext cx="184666" cy="369332"/>
+          </a:xfrm>
+          <a:prstGeom prst="rect">
+            <a:avLst/>
+          </a:prstGeom>
+          <a:noFill/>
+        </p:spPr>
+        <p:txBody>
+          <a:bodyPr wrap="none" rtlCol="0">
+            <a:spAutoFit/>
+          </a:bodyPr>
+          <a:lstStyle/>
+          <a:p>
+            <a:endParaRPr lang="en-US" dirty="0"/>
+          </a:p>
+        </p:txBody>
+      </p:sp>
+      <p:sp>
+        <p:nvSpPr>
+          <p:cNvPr id="5" name="TextBox 4"/>
+          <p:cNvSpPr txBox="1"/>
+          <p:nvPr/>
+        </p:nvSpPr>
+        <p:spPr>
+          <a:xfrm>
+            <a:off x="776111" y="1919111"/>
+            <a:ext cx="6924342" cy="1754327"/>
+          </a:xfrm>
+          <a:prstGeom prst="rect">
+            <a:avLst/>
+          </a:prstGeom>
+          <a:noFill/>
+        </p:spPr>
+        <p:txBody>
+          <a:bodyPr wrap="none" rtlCol="0">
+            <a:spAutoFit/>
+          </a:bodyPr>
+          <a:lstStyle/>
+          <a:p>
+            <a:r>
+              <a:rPr lang="en-US" sz="5400" dirty="0" smtClean="0"/>
+              <a:t>PROTOCOLS AND </a:t>
+            </a:r>
+          </a:p>
+          <a:p>
+            <a:r>
+              <a:rPr lang="en-US" sz="5400" dirty="0" smtClean="0"/>
+              <a:t>COMPLEX ALGORITHMS</a:t>
+            </a:r>
+            <a:endParaRPr lang="en-US" sz="5400" dirty="0"/>
+          </a:p>
+        </p:txBody>
+      </p:sp>
+    </p:spTree>
+    <p:extLst>
+      <p:ext uri="{BB962C8B-B14F-4D97-AF65-F5344CB8AC3E}">
+        <p14:creationId xmlns:p14="http://schemas.microsoft.com/office/powerpoint/2010/main" val="168331952"/>
+      </p:ext>
+    </p:extLst>
+  </p:cSld>
+  <p:clrMapOvr>
+    <a:masterClrMapping/>
+  </p:clrMapOvr>
+</p:sld>
+</file>
+
 <file path=ppt/slides/slide9.xml><?xml version="1.0" encoding="utf-8"?>
 <p:sld xmlns:a="http://schemas.openxmlformats.org/drawingml/2006/main" xmlns:r="http://schemas.openxmlformats.org/officeDocument/2006/relationships" xmlns:p="http://schemas.openxmlformats.org/presentationml/2006/main">
   <p:cSld>
@@ -4503,14 +4211,133 @@
       </p:grpSpPr>
       <p:sp>
         <p:nvSpPr>
-          <p:cNvPr id="4" name="TextBox 3"/>
+          <p:cNvPr id="2" name="Title 1"/>
+          <p:cNvSpPr>
+            <a:spLocks noGrp="1"/>
+          </p:cNvSpPr>
+          <p:nvPr>
+            <p:ph type="title"/>
+          </p:nvPr>
+        </p:nvSpPr>
+        <p:spPr/>
+        <p:txBody>
+          <a:bodyPr/>
+          <a:lstStyle/>
+          <a:p>
+            <a:r>
+              <a:rPr lang="en-US" dirty="0" smtClean="0">
+                <a:latin typeface="Cambria"/>
+                <a:cs typeface="Cambria"/>
+              </a:rPr>
+              <a:t>Expanded Features List</a:t>
+            </a:r>
+            <a:endParaRPr lang="en-US" dirty="0">
+              <a:latin typeface="Cambria"/>
+              <a:cs typeface="Cambria"/>
+            </a:endParaRPr>
+          </a:p>
+        </p:txBody>
+      </p:sp>
+      <p:pic>
+        <p:nvPicPr>
+          <p:cNvPr id="4" name="Picture 3" descr="icon.png"/>
+          <p:cNvPicPr>
+            <a:picLocks noChangeAspect="1"/>
+          </p:cNvPicPr>
+          <p:nvPr/>
+        </p:nvPicPr>
+        <p:blipFill>
+          <a:blip r:embed="rId2">
+            <a:extLst>
+              <a:ext uri="{28A0092B-C50C-407E-A947-70E740481C1C}">
+                <a14:useLocalDpi xmlns:a14="http://schemas.microsoft.com/office/drawing/2010/main" val="0"/>
+              </a:ext>
+            </a:extLst>
+          </a:blip>
+          <a:stretch>
+            <a:fillRect/>
+          </a:stretch>
+        </p:blipFill>
+        <p:spPr>
+          <a:xfrm>
+            <a:off x="1916289" y="1676399"/>
+            <a:ext cx="2317044" cy="2317044"/>
+          </a:xfrm>
+          <a:prstGeom prst="rect">
+            <a:avLst/>
+          </a:prstGeom>
+        </p:spPr>
+      </p:pic>
+      <p:pic>
+        <p:nvPicPr>
+          <p:cNvPr id="5" name="Picture 4" descr="map-7.png"/>
+          <p:cNvPicPr>
+            <a:picLocks noChangeAspect="1"/>
+          </p:cNvPicPr>
+          <p:nvPr/>
+        </p:nvPicPr>
+        <p:blipFill>
+          <a:blip r:embed="rId3">
+            <a:extLst>
+              <a:ext uri="{28A0092B-C50C-407E-A947-70E740481C1C}">
+                <a14:useLocalDpi xmlns:a14="http://schemas.microsoft.com/office/drawing/2010/main" val="0"/>
+              </a:ext>
+            </a:extLst>
+          </a:blip>
+          <a:stretch>
+            <a:fillRect/>
+          </a:stretch>
+        </p:blipFill>
+        <p:spPr>
+          <a:xfrm>
+            <a:off x="5367868" y="1859844"/>
+            <a:ext cx="1738489" cy="1738489"/>
+          </a:xfrm>
+          <a:prstGeom prst="rect">
+            <a:avLst/>
+          </a:prstGeom>
+        </p:spPr>
+      </p:pic>
+      <p:pic>
+        <p:nvPicPr>
+          <p:cNvPr id="6" name="Picture 5" descr="39915.png"/>
+          <p:cNvPicPr>
+            <a:picLocks noChangeAspect="1"/>
+          </p:cNvPicPr>
+          <p:nvPr/>
+        </p:nvPicPr>
+        <p:blipFill>
+          <a:blip r:embed="rId4">
+            <a:extLst>
+              <a:ext uri="{28A0092B-C50C-407E-A947-70E740481C1C}">
+                <a14:useLocalDpi xmlns:a14="http://schemas.microsoft.com/office/drawing/2010/main" val="0"/>
+              </a:ext>
+            </a:extLst>
+          </a:blip>
+          <a:stretch>
+            <a:fillRect/>
+          </a:stretch>
+        </p:blipFill>
+        <p:spPr>
+          <a:xfrm>
+            <a:off x="4840111" y="3759199"/>
+            <a:ext cx="2793890" cy="2793890"/>
+          </a:xfrm>
+          <a:prstGeom prst="rect">
+            <a:avLst/>
+          </a:prstGeom>
+        </p:spPr>
+      </p:pic>
+      <p:sp>
+        <p:nvSpPr>
+          <p:cNvPr id="8" name="TextBox 7"/>
           <p:cNvSpPr txBox="1"/>
           <p:nvPr/>
         </p:nvSpPr>
         <p:spPr>
           <a:xfrm>
-            <a:off x="2921000" y="3273778"/>
-            <a:ext cx="184666" cy="369332"/>
+            <a:off x="1986844" y="4868334"/>
+            <a:ext cx="2142934" cy="338554"/>
           </a:xfrm>
           <a:prstGeom prst="rect">
             <a:avLst/>
@@ -4523,50 +4350,163 @@
           </a:bodyPr>
           <a:lstStyle/>
           <a:p>
-            <a:endParaRPr lang="en-US" dirty="0"/>
-          </a:p>
-        </p:txBody>
-      </p:sp>
-      <p:sp>
-        <p:nvSpPr>
-          <p:cNvPr id="5" name="TextBox 4"/>
-          <p:cNvSpPr txBox="1"/>
+            <a:r>
+              <a:rPr lang="en-US" sz="1600" dirty="0" smtClean="0">
+                <a:latin typeface="Arial"/>
+                <a:cs typeface="Arial"/>
+              </a:rPr>
+              <a:t>S&amp;P gains 500 points</a:t>
+            </a:r>
+            <a:endParaRPr lang="en-US" sz="1600" dirty="0">
+              <a:latin typeface="Arial"/>
+              <a:cs typeface="Arial"/>
+            </a:endParaRPr>
+          </a:p>
+        </p:txBody>
+      </p:sp>
+      <p:sp>
+        <p:nvSpPr>
+          <p:cNvPr id="9" name="Rectangle 8"/>
+          <p:cNvSpPr/>
           <p:nvPr/>
         </p:nvSpPr>
         <p:spPr>
           <a:xfrm>
-            <a:off x="776111" y="1919111"/>
-            <a:ext cx="6924342" cy="1754327"/>
+            <a:off x="1986844" y="4868334"/>
+            <a:ext cx="2246489" cy="832555"/>
           </a:xfrm>
           <a:prstGeom prst="rect">
             <a:avLst/>
           </a:prstGeom>
           <a:noFill/>
+          <a:ln>
+            <a:solidFill>
+              <a:schemeClr val="tx1"/>
+            </a:solidFill>
+          </a:ln>
+          <a:effectLst/>
         </p:spPr>
-        <p:txBody>
-          <a:bodyPr wrap="none" rtlCol="0">
-            <a:spAutoFit/>
-          </a:bodyPr>
-          <a:lstStyle/>
-          <a:p>
-            <a:r>
-              <a:rPr lang="en-US" sz="5400" dirty="0" smtClean="0"/>
-              <a:t>PROTOCOLS AND </a:t>
-            </a:r>
-          </a:p>
-          <a:p>
-            <a:r>
-              <a:rPr lang="en-US" sz="5400" dirty="0" smtClean="0"/>
-              <a:t>COMPLEX ALGORITHMS</a:t>
-            </a:r>
-            <a:endParaRPr lang="en-US" sz="5400" dirty="0"/>
+        <p:style>
+          <a:lnRef idx="1">
+            <a:schemeClr val="accent1"/>
+          </a:lnRef>
+          <a:fillRef idx="3">
+            <a:schemeClr val="accent1"/>
+          </a:fillRef>
+          <a:effectRef idx="2">
+            <a:schemeClr val="accent1"/>
+          </a:effectRef>
+          <a:fontRef idx="minor">
+            <a:schemeClr val="lt1"/>
+          </a:fontRef>
+        </p:style>
+        <p:txBody>
+          <a:bodyPr rtlCol="0" anchor="ctr"/>
+          <a:lstStyle/>
+          <a:p>
+            <a:pPr algn="ctr"/>
+            <a:endParaRPr lang="en-US"/>
+          </a:p>
+        </p:txBody>
+      </p:sp>
+      <p:sp>
+        <p:nvSpPr>
+          <p:cNvPr id="10" name="Rounded Rectangle 9"/>
+          <p:cNvSpPr/>
+          <p:nvPr/>
+        </p:nvSpPr>
+        <p:spPr>
+          <a:xfrm>
+            <a:off x="2102556" y="5334000"/>
+            <a:ext cx="705555" cy="225778"/>
+          </a:xfrm>
+          <a:prstGeom prst="roundRect">
+            <a:avLst/>
+          </a:prstGeom>
+          <a:solidFill>
+            <a:srgbClr val="008000"/>
+          </a:solidFill>
+          <a:ln>
+            <a:solidFill>
+              <a:schemeClr val="tx1"/>
+            </a:solidFill>
+          </a:ln>
+          <a:effectLst/>
+        </p:spPr>
+        <p:style>
+          <a:lnRef idx="1">
+            <a:schemeClr val="accent1"/>
+          </a:lnRef>
+          <a:fillRef idx="3">
+            <a:schemeClr val="accent1"/>
+          </a:fillRef>
+          <a:effectRef idx="2">
+            <a:schemeClr val="accent1"/>
+          </a:effectRef>
+          <a:fontRef idx="minor">
+            <a:schemeClr val="lt1"/>
+          </a:fontRef>
+        </p:style>
+        <p:txBody>
+          <a:bodyPr rtlCol="0" anchor="ctr"/>
+          <a:lstStyle/>
+          <a:p>
+            <a:pPr algn="ctr"/>
+            <a:endParaRPr lang="en-US"/>
+          </a:p>
+        </p:txBody>
+      </p:sp>
+      <p:sp>
+        <p:nvSpPr>
+          <p:cNvPr id="11" name="Rounded Rectangle 10"/>
+          <p:cNvSpPr/>
+          <p:nvPr/>
+        </p:nvSpPr>
+        <p:spPr>
+          <a:xfrm>
+            <a:off x="2960511" y="5331178"/>
+            <a:ext cx="705555" cy="225778"/>
+          </a:xfrm>
+          <a:prstGeom prst="roundRect">
+            <a:avLst/>
+          </a:prstGeom>
+          <a:solidFill>
+            <a:srgbClr val="FF0000"/>
+          </a:solidFill>
+          <a:ln>
+            <a:solidFill>
+              <a:srgbClr val="000000"/>
+            </a:solidFill>
+          </a:ln>
+          <a:effectLst/>
+        </p:spPr>
+        <p:style>
+          <a:lnRef idx="1">
+            <a:schemeClr val="accent1"/>
+          </a:lnRef>
+          <a:fillRef idx="3">
+            <a:schemeClr val="accent1"/>
+          </a:fillRef>
+          <a:effectRef idx="2">
+            <a:schemeClr val="accent1"/>
+          </a:effectRef>
+          <a:fontRef idx="minor">
+            <a:schemeClr val="lt1"/>
+          </a:fontRef>
+        </p:style>
+        <p:txBody>
+          <a:bodyPr rtlCol="0" anchor="ctr"/>
+          <a:lstStyle/>
+          <a:p>
+            <a:pPr algn="ctr"/>
+            <a:endParaRPr lang="en-US"/>
           </a:p>
         </p:txBody>
       </p:sp>
     </p:spTree>
     <p:extLst>
       <p:ext uri="{BB962C8B-B14F-4D97-AF65-F5344CB8AC3E}">
-        <p14:creationId xmlns:p14="http://schemas.microsoft.com/office/powerpoint/2010/main" val="168331952"/>
+        <p14:creationId xmlns:p14="http://schemas.microsoft.com/office/powerpoint/2010/main" val="3980789510"/>
       </p:ext>
     </p:extLst>
   </p:cSld>

</xml_diff>

<commit_message>
added highres version of django model view
</commit_message>
<xml_diff>
--- a/presentations/Presentation1.pptx
+++ b/presentations/Presentation1.pptx
@@ -4005,8 +4005,8 @@
         </p:blipFill>
         <p:spPr>
           <a:xfrm>
-            <a:off x="-5419" y="276727"/>
-            <a:ext cx="9154838" cy="6304547"/>
+            <a:off x="109585" y="541556"/>
+            <a:ext cx="8924830" cy="5774889"/>
           </a:xfrm>
           <a:prstGeom prst="rect">
             <a:avLst/>

</xml_diff>